<commit_message>
Made small updates to ICRA paper
</commit_message>
<xml_diff>
--- a/ICRA19/pictures/pdf/SetUp.pptx
+++ b/ICRA19/pictures/pdf/SetUp.pptx
@@ -302,7 +302,7 @@
           <a:p>
             <a:fld id="{F694978D-A894-E24D-9868-C9A03761E7E6}" type="datetimeFigureOut">
               <a:rPr lang="en-US" smtClean="0"/>
-              <a:t>9/13/18</a:t>
+              <a:t>2/12/19</a:t>
             </a:fld>
             <a:endParaRPr lang="en-US"/>
           </a:p>
@@ -470,7 +470,7 @@
           <a:p>
             <a:fld id="{F694978D-A894-E24D-9868-C9A03761E7E6}" type="datetimeFigureOut">
               <a:rPr lang="en-US" smtClean="0"/>
-              <a:t>9/13/18</a:t>
+              <a:t>2/12/19</a:t>
             </a:fld>
             <a:endParaRPr lang="en-US"/>
           </a:p>
@@ -648,7 +648,7 @@
           <a:p>
             <a:fld id="{F694978D-A894-E24D-9868-C9A03761E7E6}" type="datetimeFigureOut">
               <a:rPr lang="en-US" smtClean="0"/>
-              <a:t>9/13/18</a:t>
+              <a:t>2/12/19</a:t>
             </a:fld>
             <a:endParaRPr lang="en-US"/>
           </a:p>
@@ -816,7 +816,7 @@
           <a:p>
             <a:fld id="{F694978D-A894-E24D-9868-C9A03761E7E6}" type="datetimeFigureOut">
               <a:rPr lang="en-US" smtClean="0"/>
-              <a:t>9/13/18</a:t>
+              <a:t>2/12/19</a:t>
             </a:fld>
             <a:endParaRPr lang="en-US"/>
           </a:p>
@@ -1061,7 +1061,7 @@
           <a:p>
             <a:fld id="{F694978D-A894-E24D-9868-C9A03761E7E6}" type="datetimeFigureOut">
               <a:rPr lang="en-US" smtClean="0"/>
-              <a:t>9/13/18</a:t>
+              <a:t>2/12/19</a:t>
             </a:fld>
             <a:endParaRPr lang="en-US"/>
           </a:p>
@@ -1346,7 +1346,7 @@
           <a:p>
             <a:fld id="{F694978D-A894-E24D-9868-C9A03761E7E6}" type="datetimeFigureOut">
               <a:rPr lang="en-US" smtClean="0"/>
-              <a:t>9/13/18</a:t>
+              <a:t>2/12/19</a:t>
             </a:fld>
             <a:endParaRPr lang="en-US"/>
           </a:p>
@@ -1765,7 +1765,7 @@
           <a:p>
             <a:fld id="{F694978D-A894-E24D-9868-C9A03761E7E6}" type="datetimeFigureOut">
               <a:rPr lang="en-US" smtClean="0"/>
-              <a:t>9/13/18</a:t>
+              <a:t>2/12/19</a:t>
             </a:fld>
             <a:endParaRPr lang="en-US"/>
           </a:p>
@@ -1882,7 +1882,7 @@
           <a:p>
             <a:fld id="{F694978D-A894-E24D-9868-C9A03761E7E6}" type="datetimeFigureOut">
               <a:rPr lang="en-US" smtClean="0"/>
-              <a:t>9/13/18</a:t>
+              <a:t>2/12/19</a:t>
             </a:fld>
             <a:endParaRPr lang="en-US"/>
           </a:p>
@@ -1977,7 +1977,7 @@
           <a:p>
             <a:fld id="{F694978D-A894-E24D-9868-C9A03761E7E6}" type="datetimeFigureOut">
               <a:rPr lang="en-US" smtClean="0"/>
-              <a:t>9/13/18</a:t>
+              <a:t>2/12/19</a:t>
             </a:fld>
             <a:endParaRPr lang="en-US"/>
           </a:p>
@@ -2252,7 +2252,7 @@
           <a:p>
             <a:fld id="{F694978D-A894-E24D-9868-C9A03761E7E6}" type="datetimeFigureOut">
               <a:rPr lang="en-US" smtClean="0"/>
-              <a:t>9/13/18</a:t>
+              <a:t>2/12/19</a:t>
             </a:fld>
             <a:endParaRPr lang="en-US"/>
           </a:p>
@@ -2504,7 +2504,7 @@
           <a:p>
             <a:fld id="{F694978D-A894-E24D-9868-C9A03761E7E6}" type="datetimeFigureOut">
               <a:rPr lang="en-US" smtClean="0"/>
-              <a:t>9/13/18</a:t>
+              <a:t>2/12/19</a:t>
             </a:fld>
             <a:endParaRPr lang="en-US"/>
           </a:p>
@@ -2715,7 +2715,7 @@
           <a:p>
             <a:fld id="{F694978D-A894-E24D-9868-C9A03761E7E6}" type="datetimeFigureOut">
               <a:rPr lang="en-US" smtClean="0"/>
-              <a:t>9/13/18</a:t>
+              <a:t>2/12/19</a:t>
             </a:fld>
             <a:endParaRPr lang="en-US"/>
           </a:p>
@@ -3682,8 +3682,8 @@
         </p:nvSpPr>
         <p:spPr>
           <a:xfrm>
-            <a:off x="4240547" y="165444"/>
-            <a:ext cx="1813111" cy="369332"/>
+            <a:off x="4203339" y="103183"/>
+            <a:ext cx="1772156" cy="369332"/>
           </a:xfrm>
           <a:prstGeom prst="rect">
             <a:avLst/>
@@ -3696,13 +3696,12 @@
           </a:bodyPr>
           <a:lstStyle/>
           <a:p>
-            <a:pPr algn="ctr"/>
             <a:r>
               <a:rPr lang="en-US" dirty="0">
                 <a:latin typeface="Times"/>
                 <a:cs typeface="Times"/>
               </a:rPr>
-              <a:t>30W LED Lights</a:t>
+              <a:t>30W LED Lights  </a:t>
             </a:r>
           </a:p>
         </p:txBody>
@@ -3718,8 +3717,8 @@
         </p:nvCxnSpPr>
         <p:spPr>
           <a:xfrm flipH="1">
-            <a:off x="4977609" y="534776"/>
-            <a:ext cx="169494" cy="1133628"/>
+            <a:off x="4940401" y="472515"/>
+            <a:ext cx="149016" cy="1133628"/>
           </a:xfrm>
           <a:prstGeom prst="straightConnector1">
             <a:avLst/>
@@ -4681,7 +4680,7 @@
           </a:ln>
           <a:extLst>
             <a:ext uri="{909E8E84-426E-40dd-AFC4-6F175D3DCCD1}">
-              <a14:hiddenFill xmlns:a14="http://schemas.microsoft.com/office/drawing/2010/main" xmlns="">
+              <a14:hiddenFill xmlns="" xmlns:a14="http://schemas.microsoft.com/office/drawing/2010/main">
                 <a:solidFill>
                   <a:srgbClr val="FFFFFF"/>
                 </a:solidFill>
@@ -4727,7 +4726,7 @@
           </a:ln>
           <a:extLst>
             <a:ext uri="{909E8E84-426E-40dd-AFC4-6F175D3DCCD1}">
-              <a14:hiddenFill xmlns:a14="http://schemas.microsoft.com/office/drawing/2010/main" xmlns="">
+              <a14:hiddenFill xmlns="" xmlns:a14="http://schemas.microsoft.com/office/drawing/2010/main">
                 <a:solidFill>
                   <a:srgbClr val="FFFFFF"/>
                 </a:solidFill>
@@ -4774,7 +4773,7 @@
           </a:ln>
           <a:extLst>
             <a:ext uri="{909E8E84-426E-40dd-AFC4-6F175D3DCCD1}">
-              <a14:hiddenFill xmlns:a14="http://schemas.microsoft.com/office/drawing/2010/main" xmlns="">
+              <a14:hiddenFill xmlns="" xmlns:a14="http://schemas.microsoft.com/office/drawing/2010/main">
                 <a:noFill/>
               </a14:hiddenFill>
             </a:ext>
@@ -4808,7 +4807,7 @@
           </a:ln>
           <a:extLst>
             <a:ext uri="{909E8E84-426E-40dd-AFC4-6F175D3DCCD1}">
-              <a14:hiddenFill xmlns:a14="http://schemas.microsoft.com/office/drawing/2010/main" xmlns="">
+              <a14:hiddenFill xmlns="" xmlns:a14="http://schemas.microsoft.com/office/drawing/2010/main">
                 <a:noFill/>
               </a14:hiddenFill>
             </a:ext>
@@ -6014,6 +6013,45 @@
                 <a:cs typeface="Times"/>
               </a:rPr>
               <a:t>𝜃 = 45°</a:t>
+            </a:r>
+          </a:p>
+        </p:txBody>
+      </p:sp>
+      <p:sp>
+        <p:nvSpPr>
+          <p:cNvPr id="80" name="TextBox 79">
+            <a:extLst>
+              <a:ext uri="{FF2B5EF4-FFF2-40B4-BE49-F238E27FC236}">
+                <a16:creationId xmlns:a16="http://schemas.microsoft.com/office/drawing/2014/main" id="{5C8728AC-E21F-3E45-9B13-D72EA789AB21}"/>
+              </a:ext>
+            </a:extLst>
+          </p:cNvPr>
+          <p:cNvSpPr txBox="1"/>
+          <p:nvPr/>
+        </p:nvSpPr>
+        <p:spPr>
+          <a:xfrm>
+            <a:off x="5432039" y="431851"/>
+            <a:ext cx="2340361" cy="923330"/>
+          </a:xfrm>
+          <a:prstGeom prst="rect">
+            <a:avLst/>
+          </a:prstGeom>
+          <a:noFill/>
+        </p:spPr>
+        <p:txBody>
+          <a:bodyPr wrap="square" rtlCol="0">
+            <a:spAutoFit/>
+          </a:bodyPr>
+          <a:lstStyle/>
+          <a:p>
+            <a:pPr algn="ctr"/>
+            <a:r>
+              <a:rPr lang="en-US" dirty="0">
+                <a:latin typeface="Times"/>
+                <a:cs typeface="Times"/>
+              </a:rPr>
+              <a:t>corner lights are further away and thus require more watts</a:t>
             </a:r>
           </a:p>
         </p:txBody>

</xml_diff>